<commit_message>
O jar mais brabo
</commit_message>
<xml_diff>
--- a/MONITORAMENTO/Documentação/PPTs/Cold Stock Apresentação - Sprint 2.pptx
+++ b/MONITORAMENTO/Documentação/PPTs/Cold Stock Apresentação - Sprint 2.pptx
@@ -271,7 +271,7 @@
           <a:p>
             <a:fld id="{47278C1A-96D6-4232-9F36-8FBD0594C554}" type="datetimeFigureOut">
               <a:rPr lang="pt-BR" smtClean="0"/>
-              <a:t>25/10/2020</a:t>
+              <a:t>26/10/2020</a:t>
             </a:fld>
             <a:endParaRPr lang="pt-BR"/>
           </a:p>
@@ -439,7 +439,7 @@
           <a:p>
             <a:fld id="{47278C1A-96D6-4232-9F36-8FBD0594C554}" type="datetimeFigureOut">
               <a:rPr lang="pt-BR" smtClean="0"/>
-              <a:t>25/10/2020</a:t>
+              <a:t>26/10/2020</a:t>
             </a:fld>
             <a:endParaRPr lang="pt-BR"/>
           </a:p>
@@ -617,7 +617,7 @@
           <a:p>
             <a:fld id="{47278C1A-96D6-4232-9F36-8FBD0594C554}" type="datetimeFigureOut">
               <a:rPr lang="pt-BR" smtClean="0"/>
-              <a:t>25/10/2020</a:t>
+              <a:t>26/10/2020</a:t>
             </a:fld>
             <a:endParaRPr lang="pt-BR"/>
           </a:p>
@@ -785,7 +785,7 @@
           <a:p>
             <a:fld id="{47278C1A-96D6-4232-9F36-8FBD0594C554}" type="datetimeFigureOut">
               <a:rPr lang="pt-BR" smtClean="0"/>
-              <a:t>25/10/2020</a:t>
+              <a:t>26/10/2020</a:t>
             </a:fld>
             <a:endParaRPr lang="pt-BR"/>
           </a:p>
@@ -1030,7 +1030,7 @@
           <a:p>
             <a:fld id="{47278C1A-96D6-4232-9F36-8FBD0594C554}" type="datetimeFigureOut">
               <a:rPr lang="pt-BR" smtClean="0"/>
-              <a:t>25/10/2020</a:t>
+              <a:t>26/10/2020</a:t>
             </a:fld>
             <a:endParaRPr lang="pt-BR"/>
           </a:p>
@@ -1259,7 +1259,7 @@
           <a:p>
             <a:fld id="{47278C1A-96D6-4232-9F36-8FBD0594C554}" type="datetimeFigureOut">
               <a:rPr lang="pt-BR" smtClean="0"/>
-              <a:t>25/10/2020</a:t>
+              <a:t>26/10/2020</a:t>
             </a:fld>
             <a:endParaRPr lang="pt-BR"/>
           </a:p>
@@ -1623,7 +1623,7 @@
           <a:p>
             <a:fld id="{47278C1A-96D6-4232-9F36-8FBD0594C554}" type="datetimeFigureOut">
               <a:rPr lang="pt-BR" smtClean="0"/>
-              <a:t>25/10/2020</a:t>
+              <a:t>26/10/2020</a:t>
             </a:fld>
             <a:endParaRPr lang="pt-BR"/>
           </a:p>
@@ -1740,7 +1740,7 @@
           <a:p>
             <a:fld id="{47278C1A-96D6-4232-9F36-8FBD0594C554}" type="datetimeFigureOut">
               <a:rPr lang="pt-BR" smtClean="0"/>
-              <a:t>25/10/2020</a:t>
+              <a:t>26/10/2020</a:t>
             </a:fld>
             <a:endParaRPr lang="pt-BR"/>
           </a:p>
@@ -1835,7 +1835,7 @@
           <a:p>
             <a:fld id="{47278C1A-96D6-4232-9F36-8FBD0594C554}" type="datetimeFigureOut">
               <a:rPr lang="pt-BR" smtClean="0"/>
-              <a:t>25/10/2020</a:t>
+              <a:t>26/10/2020</a:t>
             </a:fld>
             <a:endParaRPr lang="pt-BR"/>
           </a:p>
@@ -2110,7 +2110,7 @@
           <a:p>
             <a:fld id="{47278C1A-96D6-4232-9F36-8FBD0594C554}" type="datetimeFigureOut">
               <a:rPr lang="pt-BR" smtClean="0"/>
-              <a:t>25/10/2020</a:t>
+              <a:t>26/10/2020</a:t>
             </a:fld>
             <a:endParaRPr lang="pt-BR"/>
           </a:p>
@@ -2362,7 +2362,7 @@
           <a:p>
             <a:fld id="{47278C1A-96D6-4232-9F36-8FBD0594C554}" type="datetimeFigureOut">
               <a:rPr lang="pt-BR" smtClean="0"/>
-              <a:t>25/10/2020</a:t>
+              <a:t>26/10/2020</a:t>
             </a:fld>
             <a:endParaRPr lang="pt-BR"/>
           </a:p>
@@ -2573,7 +2573,7 @@
           <a:p>
             <a:fld id="{47278C1A-96D6-4232-9F36-8FBD0594C554}" type="datetimeFigureOut">
               <a:rPr lang="pt-BR" smtClean="0"/>
-              <a:t>25/10/2020</a:t>
+              <a:t>26/10/2020</a:t>
             </a:fld>
             <a:endParaRPr lang="pt-BR"/>
           </a:p>
@@ -3321,7 +3321,7 @@
                     <a14:useLocalDpi xmlns:a14="http://schemas.microsoft.com/office/drawing/2010/main" val="0"/>
                   </a:ext>
                   <a:ext uri="{96DAC541-7B7A-43D3-8B79-37D633B846F1}">
-                    <asvg:svgBlip xmlns:asvg="http://schemas.microsoft.com/office/drawing/2016/SVG/main" xmlns="" r:embed="rId3"/>
+                    <asvg:svgBlip xmlns="" xmlns:asvg="http://schemas.microsoft.com/office/drawing/2016/SVG/main" r:embed="rId3"/>
                   </a:ext>
                 </a:extLst>
               </a:blip>
@@ -4244,7 +4244,7 @@
                     <a14:useLocalDpi xmlns:a14="http://schemas.microsoft.com/office/drawing/2010/main" val="0"/>
                   </a:ext>
                   <a:ext uri="{96DAC541-7B7A-43D3-8B79-37D633B846F1}">
-                    <asvg:svgBlip xmlns:asvg="http://schemas.microsoft.com/office/drawing/2016/SVG/main" xmlns="" r:embed="rId3"/>
+                    <asvg:svgBlip xmlns="" xmlns:asvg="http://schemas.microsoft.com/office/drawing/2016/SVG/main" r:embed="rId3"/>
                   </a:ext>
                 </a:extLst>
               </a:blip>
@@ -4834,7 +4834,7 @@
                     <a14:useLocalDpi xmlns:a14="http://schemas.microsoft.com/office/drawing/2010/main" val="0"/>
                   </a:ext>
                   <a:ext uri="{96DAC541-7B7A-43D3-8B79-37D633B846F1}">
-                    <asvg:svgBlip xmlns:asvg="http://schemas.microsoft.com/office/drawing/2016/SVG/main" xmlns="" r:embed="rId3"/>
+                    <asvg:svgBlip xmlns="" xmlns:asvg="http://schemas.microsoft.com/office/drawing/2016/SVG/main" r:embed="rId3"/>
                   </a:ext>
                 </a:extLst>
               </a:blip>
@@ -5507,7 +5507,7 @@
                     <a14:useLocalDpi xmlns:a14="http://schemas.microsoft.com/office/drawing/2010/main" val="0"/>
                   </a:ext>
                   <a:ext uri="{96DAC541-7B7A-43D3-8B79-37D633B846F1}">
-                    <asvg:svgBlip xmlns:asvg="http://schemas.microsoft.com/office/drawing/2016/SVG/main" xmlns="" r:embed="rId3"/>
+                    <asvg:svgBlip xmlns="" xmlns:asvg="http://schemas.microsoft.com/office/drawing/2016/SVG/main" r:embed="rId3"/>
                   </a:ext>
                 </a:extLst>
               </a:blip>
@@ -7500,7 +7500,7 @@
                 <a14:useLocalDpi xmlns:a14="http://schemas.microsoft.com/office/drawing/2010/main" val="0"/>
               </a:ext>
               <a:ext uri="{96DAC541-7B7A-43D3-8B79-37D633B846F1}">
-                <asvg:svgBlip xmlns:asvg="http://schemas.microsoft.com/office/drawing/2016/SVG/main" xmlns="" r:embed="rId4"/>
+                <asvg:svgBlip xmlns="" xmlns:asvg="http://schemas.microsoft.com/office/drawing/2016/SVG/main" r:embed="rId4"/>
               </a:ext>
             </a:extLst>
           </a:blip>
@@ -9250,7 +9250,7 @@
                     <a14:useLocalDpi xmlns:a14="http://schemas.microsoft.com/office/drawing/2010/main" val="0"/>
                   </a:ext>
                   <a:ext uri="{96DAC541-7B7A-43D3-8B79-37D633B846F1}">
-                    <asvg:svgBlip xmlns:asvg="http://schemas.microsoft.com/office/drawing/2016/SVG/main" xmlns="" r:embed="rId3"/>
+                    <asvg:svgBlip xmlns="" xmlns:asvg="http://schemas.microsoft.com/office/drawing/2016/SVG/main" r:embed="rId3"/>
                   </a:ext>
                 </a:extLst>
               </a:blip>
@@ -9844,7 +9844,7 @@
                 <a14:useLocalDpi xmlns:a14="http://schemas.microsoft.com/office/drawing/2010/main" val="0"/>
               </a:ext>
               <a:ext uri="{96DAC541-7B7A-43D3-8B79-37D633B846F1}">
-                <asvg:svgBlip xmlns:asvg="http://schemas.microsoft.com/office/drawing/2016/SVG/main" xmlns="" r:embed="rId4"/>
+                <asvg:svgBlip xmlns="" xmlns:asvg="http://schemas.microsoft.com/office/drawing/2016/SVG/main" r:embed="rId4"/>
               </a:ext>
             </a:extLst>
           </a:blip>
@@ -12334,7 +12334,7 @@
                     <a14:useLocalDpi xmlns:a14="http://schemas.microsoft.com/office/drawing/2010/main" val="0"/>
                   </a:ext>
                   <a:ext uri="{96DAC541-7B7A-43D3-8B79-37D633B846F1}">
-                    <asvg:svgBlip xmlns:asvg="http://schemas.microsoft.com/office/drawing/2016/SVG/main" xmlns="" r:embed="rId3"/>
+                    <asvg:svgBlip xmlns="" xmlns:asvg="http://schemas.microsoft.com/office/drawing/2016/SVG/main" r:embed="rId3"/>
                   </a:ext>
                 </a:extLst>
               </a:blip>
@@ -12939,7 +12939,7 @@
                     <a14:useLocalDpi xmlns:a14="http://schemas.microsoft.com/office/drawing/2010/main" val="0"/>
                   </a:ext>
                   <a:ext uri="{96DAC541-7B7A-43D3-8B79-37D633B846F1}">
-                    <asvg:svgBlip xmlns:asvg="http://schemas.microsoft.com/office/drawing/2016/SVG/main" xmlns="" r:embed="rId3"/>
+                    <asvg:svgBlip xmlns="" xmlns:asvg="http://schemas.microsoft.com/office/drawing/2016/SVG/main" r:embed="rId3"/>
                   </a:ext>
                 </a:extLst>
               </a:blip>
@@ -13544,7 +13544,7 @@
                     <a14:useLocalDpi xmlns:a14="http://schemas.microsoft.com/office/drawing/2010/main" val="0"/>
                   </a:ext>
                   <a:ext uri="{96DAC541-7B7A-43D3-8B79-37D633B846F1}">
-                    <asvg:svgBlip xmlns:asvg="http://schemas.microsoft.com/office/drawing/2016/SVG/main" xmlns="" r:embed="rId3"/>
+                    <asvg:svgBlip xmlns="" xmlns:asvg="http://schemas.microsoft.com/office/drawing/2016/SVG/main" r:embed="rId3"/>
                   </a:ext>
                 </a:extLst>
               </a:blip>
@@ -14829,7 +14829,7 @@
                 <a14:useLocalDpi xmlns:a14="http://schemas.microsoft.com/office/drawing/2010/main" val="0"/>
               </a:ext>
               <a:ext uri="{96DAC541-7B7A-43D3-8B79-37D633B846F1}">
-                <asvg:svgBlip xmlns:asvg="http://schemas.microsoft.com/office/drawing/2016/SVG/main" xmlns="" r:embed="rId4"/>
+                <asvg:svgBlip xmlns="" xmlns:asvg="http://schemas.microsoft.com/office/drawing/2016/SVG/main" r:embed="rId4"/>
               </a:ext>
             </a:extLst>
           </a:blip>
@@ -17742,7 +17742,7 @@
                     <a14:useLocalDpi xmlns:a14="http://schemas.microsoft.com/office/drawing/2010/main" val="0"/>
                   </a:ext>
                   <a:ext uri="{96DAC541-7B7A-43D3-8B79-37D633B846F1}">
-                    <asvg:svgBlip xmlns:asvg="http://schemas.microsoft.com/office/drawing/2016/SVG/main" xmlns="" r:embed="rId3"/>
+                    <asvg:svgBlip xmlns="" xmlns:asvg="http://schemas.microsoft.com/office/drawing/2016/SVG/main" r:embed="rId3"/>
                   </a:ext>
                 </a:extLst>
               </a:blip>
@@ -20688,7 +20688,7 @@
                     <a14:useLocalDpi xmlns:a14="http://schemas.microsoft.com/office/drawing/2010/main" val="0"/>
                   </a:ext>
                   <a:ext uri="{96DAC541-7B7A-43D3-8B79-37D633B846F1}">
-                    <asvg:svgBlip xmlns:asvg="http://schemas.microsoft.com/office/drawing/2016/SVG/main" xmlns="" r:embed="rId3"/>
+                    <asvg:svgBlip xmlns="" xmlns:asvg="http://schemas.microsoft.com/office/drawing/2016/SVG/main" r:embed="rId3"/>
                   </a:ext>
                 </a:extLst>
               </a:blip>
@@ -20803,6 +20803,30 @@
           </a:prstGeom>
         </p:spPr>
       </p:pic>
+      <p:pic>
+        <p:nvPicPr>
+          <p:cNvPr id="2" name="Imagem 1"/>
+          <p:cNvPicPr>
+            <a:picLocks noChangeAspect="1"/>
+          </p:cNvPicPr>
+          <p:nvPr/>
+        </p:nvPicPr>
+        <p:blipFill>
+          <a:blip r:embed="rId5"/>
+          <a:stretch>
+            <a:fillRect/>
+          </a:stretch>
+        </p:blipFill>
+        <p:spPr>
+          <a:xfrm>
+            <a:off x="2577923" y="1277712"/>
+            <a:ext cx="7245345" cy="5295465"/>
+          </a:xfrm>
+          <a:prstGeom prst="rect">
+            <a:avLst/>
+          </a:prstGeom>
+        </p:spPr>
+      </p:pic>
     </p:spTree>
     <p:extLst>
       <p:ext uri="{BB962C8B-B14F-4D97-AF65-F5344CB8AC3E}">
@@ -20911,6 +20935,50 @@
                                         <p:cTn id="9" dur="500"/>
                                         <p:tgtEl>
                                           <p:spTgt spid="5"/>
+                                        </p:tgtEl>
+                                      </p:cBhvr>
+                                    </p:animEffect>
+                                  </p:childTnLst>
+                                </p:cTn>
+                              </p:par>
+                            </p:childTnLst>
+                          </p:cTn>
+                        </p:par>
+                        <p:par>
+                          <p:cTn id="10" fill="hold">
+                            <p:stCondLst>
+                              <p:cond delay="500"/>
+                            </p:stCondLst>
+                            <p:childTnLst>
+                              <p:par>
+                                <p:cTn id="11" presetID="10" presetClass="entr" presetSubtype="0" fill="hold" nodeType="afterEffect">
+                                  <p:stCondLst>
+                                    <p:cond delay="0"/>
+                                  </p:stCondLst>
+                                  <p:childTnLst>
+                                    <p:set>
+                                      <p:cBhvr>
+                                        <p:cTn id="12" dur="1" fill="hold">
+                                          <p:stCondLst>
+                                            <p:cond delay="0"/>
+                                          </p:stCondLst>
+                                        </p:cTn>
+                                        <p:tgtEl>
+                                          <p:spTgt spid="2"/>
+                                        </p:tgtEl>
+                                        <p:attrNameLst>
+                                          <p:attrName>style.visibility</p:attrName>
+                                        </p:attrNameLst>
+                                      </p:cBhvr>
+                                      <p:to>
+                                        <p:strVal val="visible"/>
+                                      </p:to>
+                                    </p:set>
+                                    <p:animEffect transition="in" filter="fade">
+                                      <p:cBhvr>
+                                        <p:cTn id="13" dur="1000"/>
+                                        <p:tgtEl>
+                                          <p:spTgt spid="2"/>
                                         </p:tgtEl>
                                       </p:cBhvr>
                                     </p:animEffect>
@@ -21311,7 +21379,7 @@
                     <a14:useLocalDpi xmlns:a14="http://schemas.microsoft.com/office/drawing/2010/main" val="0"/>
                   </a:ext>
                   <a:ext uri="{96DAC541-7B7A-43D3-8B79-37D633B846F1}">
-                    <asvg:svgBlip xmlns:asvg="http://schemas.microsoft.com/office/drawing/2016/SVG/main" xmlns="" r:embed="rId4"/>
+                    <asvg:svgBlip xmlns="" xmlns:asvg="http://schemas.microsoft.com/office/drawing/2016/SVG/main" r:embed="rId4"/>
                   </a:ext>
                 </a:extLst>
               </a:blip>
@@ -21331,6 +21399,30 @@
           </p:pic>
         </p:grpSp>
       </p:grpSp>
+      <p:pic>
+        <p:nvPicPr>
+          <p:cNvPr id="2" name="Imagem 1"/>
+          <p:cNvPicPr>
+            <a:picLocks noChangeAspect="1"/>
+          </p:cNvPicPr>
+          <p:nvPr/>
+        </p:nvPicPr>
+        <p:blipFill>
+          <a:blip r:embed="rId5"/>
+          <a:stretch>
+            <a:fillRect/>
+          </a:stretch>
+        </p:blipFill>
+        <p:spPr>
+          <a:xfrm>
+            <a:off x="1700637" y="1302201"/>
+            <a:ext cx="8790725" cy="5059410"/>
+          </a:xfrm>
+          <a:prstGeom prst="rect">
+            <a:avLst/>
+          </a:prstGeom>
+        </p:spPr>
+      </p:pic>
     </p:spTree>
     <p:extLst>
       <p:ext uri="{BB962C8B-B14F-4D97-AF65-F5344CB8AC3E}">
@@ -21439,6 +21531,50 @@
                                         <p:cTn id="9" dur="500"/>
                                         <p:tgtEl>
                                           <p:spTgt spid="26"/>
+                                        </p:tgtEl>
+                                      </p:cBhvr>
+                                    </p:animEffect>
+                                  </p:childTnLst>
+                                </p:cTn>
+                              </p:par>
+                            </p:childTnLst>
+                          </p:cTn>
+                        </p:par>
+                        <p:par>
+                          <p:cTn id="10" fill="hold">
+                            <p:stCondLst>
+                              <p:cond delay="500"/>
+                            </p:stCondLst>
+                            <p:childTnLst>
+                              <p:par>
+                                <p:cTn id="11" presetID="10" presetClass="entr" presetSubtype="0" fill="hold" nodeType="afterEffect">
+                                  <p:stCondLst>
+                                    <p:cond delay="0"/>
+                                  </p:stCondLst>
+                                  <p:childTnLst>
+                                    <p:set>
+                                      <p:cBhvr>
+                                        <p:cTn id="12" dur="1" fill="hold">
+                                          <p:stCondLst>
+                                            <p:cond delay="0"/>
+                                          </p:stCondLst>
+                                        </p:cTn>
+                                        <p:tgtEl>
+                                          <p:spTgt spid="2"/>
+                                        </p:tgtEl>
+                                        <p:attrNameLst>
+                                          <p:attrName>style.visibility</p:attrName>
+                                        </p:attrNameLst>
+                                      </p:cBhvr>
+                                      <p:to>
+                                        <p:strVal val="visible"/>
+                                      </p:to>
+                                    </p:set>
+                                    <p:animEffect transition="in" filter="fade">
+                                      <p:cBhvr>
+                                        <p:cTn id="13" dur="1000"/>
+                                        <p:tgtEl>
+                                          <p:spTgt spid="2"/>
                                         </p:tgtEl>
                                       </p:cBhvr>
                                     </p:animEffect>
@@ -21780,7 +21916,7 @@
                     <a14:useLocalDpi xmlns:a14="http://schemas.microsoft.com/office/drawing/2010/main" val="0"/>
                   </a:ext>
                   <a:ext uri="{96DAC541-7B7A-43D3-8B79-37D633B846F1}">
-                    <asvg:svgBlip xmlns:asvg="http://schemas.microsoft.com/office/drawing/2016/SVG/main" xmlns="" r:embed="rId4"/>
+                    <asvg:svgBlip xmlns="" xmlns:asvg="http://schemas.microsoft.com/office/drawing/2016/SVG/main" r:embed="rId4"/>
                   </a:ext>
                 </a:extLst>
               </a:blip>
@@ -22402,7 +22538,7 @@
                 <a14:useLocalDpi xmlns:a14="http://schemas.microsoft.com/office/drawing/2010/main" val="0"/>
               </a:ext>
               <a:ext uri="{96DAC541-7B7A-43D3-8B79-37D633B846F1}">
-                <asvg:svgBlip xmlns:asvg="http://schemas.microsoft.com/office/drawing/2016/SVG/main" xmlns="" r:embed="rId4"/>
+                <asvg:svgBlip xmlns="" xmlns:asvg="http://schemas.microsoft.com/office/drawing/2016/SVG/main" r:embed="rId4"/>
               </a:ext>
             </a:extLst>
           </a:blip>
@@ -24220,7 +24356,7 @@
                     <a14:useLocalDpi xmlns:a14="http://schemas.microsoft.com/office/drawing/2010/main" val="0"/>
                   </a:ext>
                   <a:ext uri="{96DAC541-7B7A-43D3-8B79-37D633B846F1}">
-                    <asvg:svgBlip xmlns:asvg="http://schemas.microsoft.com/office/drawing/2016/SVG/main" xmlns="" r:embed="rId3"/>
+                    <asvg:svgBlip xmlns="" xmlns:asvg="http://schemas.microsoft.com/office/drawing/2016/SVG/main" r:embed="rId3"/>
                   </a:ext>
                 </a:extLst>
               </a:blip>
@@ -24884,7 +25020,7 @@
                     <a14:useLocalDpi xmlns:a14="http://schemas.microsoft.com/office/drawing/2010/main" val="0"/>
                   </a:ext>
                   <a:ext uri="{96DAC541-7B7A-43D3-8B79-37D633B846F1}">
-                    <asvg:svgBlip xmlns:asvg="http://schemas.microsoft.com/office/drawing/2016/SVG/main" xmlns="" r:embed="rId3"/>
+                    <asvg:svgBlip xmlns="" xmlns:asvg="http://schemas.microsoft.com/office/drawing/2016/SVG/main" r:embed="rId3"/>
                   </a:ext>
                 </a:extLst>
               </a:blip>
@@ -25474,12 +25610,6 @@
 </file>
 
 <file path=customXml/item1.xml><?xml version="1.0" encoding="utf-8"?>
-<p:properties xmlns:p="http://schemas.microsoft.com/office/2006/metadata/properties" xmlns:xsi="http://www.w3.org/2001/XMLSchema-instance" xmlns:pc="http://schemas.microsoft.com/office/infopath/2007/PartnerControls">
-  <documentManagement/>
-</p:properties>
-</file>
-
-<file path=customXml/item2.xml><?xml version="1.0" encoding="utf-8"?>
 <ct:contentTypeSchema xmlns:ct="http://schemas.microsoft.com/office/2006/metadata/contentType" xmlns:ma="http://schemas.microsoft.com/office/2006/metadata/properties/metaAttributes" ct:_="" ma:_="" ma:contentTypeName="Document" ma:contentTypeID="0x010100A663B016B9E10D44AF2D6A2076639652" ma:contentTypeVersion="9" ma:contentTypeDescription="Create a new document." ma:contentTypeScope="" ma:versionID="487f2b4f5bb26e664e658aeeb82afc06">
   <xsd:schema xmlns:xsd="http://www.w3.org/2001/XMLSchema" xmlns:xs="http://www.w3.org/2001/XMLSchema" xmlns:p="http://schemas.microsoft.com/office/2006/metadata/properties" xmlns:ns3="1f168f81-3f83-4b33-9f0c-ec152bce3f98" xmlns:ns4="86822d51-02f5-488a-80f3-0b621e7c317a" targetNamespace="http://schemas.microsoft.com/office/2006/metadata/properties" ma:root="true" ma:fieldsID="edc5afedb1afb76831d7c08402d80832" ns3:_="" ns4:_="">
     <xsd:import namespace="1f168f81-3f83-4b33-9f0c-ec152bce3f98"/>
@@ -25676,6 +25806,12 @@
 </ct:contentTypeSchema>
 </file>
 
+<file path=customXml/item2.xml><?xml version="1.0" encoding="utf-8"?>
+<p:properties xmlns:p="http://schemas.microsoft.com/office/2006/metadata/properties" xmlns:xsi="http://www.w3.org/2001/XMLSchema-instance" xmlns:pc="http://schemas.microsoft.com/office/infopath/2007/PartnerControls">
+  <documentManagement/>
+</p:properties>
+</file>
+
 <file path=customXml/item3.xml><?xml version="1.0" encoding="utf-8"?>
 <?mso-contentType ?>
 <FormTemplates xmlns="http://schemas.microsoft.com/sharepoint/v3/contenttype/forms">
@@ -25686,23 +25822,6 @@
 </file>
 
 <file path=customXml/itemProps1.xml><?xml version="1.0" encoding="utf-8"?>
-<ds:datastoreItem xmlns:ds="http://schemas.openxmlformats.org/officeDocument/2006/customXml" ds:itemID="{7972C250-C430-4380-B8BD-02E395B67AF0}">
-  <ds:schemaRefs>
-    <ds:schemaRef ds:uri="http://purl.org/dc/dcmitype/"/>
-    <ds:schemaRef ds:uri="http://purl.org/dc/terms/"/>
-    <ds:schemaRef ds:uri="http://schemas.openxmlformats.org/package/2006/metadata/core-properties"/>
-    <ds:schemaRef ds:uri="http://schemas.microsoft.com/office/2006/documentManagement/types"/>
-    <ds:schemaRef ds:uri="http://www.w3.org/XML/1998/namespace"/>
-    <ds:schemaRef ds:uri="http://schemas.microsoft.com/office/infopath/2007/PartnerControls"/>
-    <ds:schemaRef ds:uri="http://purl.org/dc/elements/1.1/"/>
-    <ds:schemaRef ds:uri="86822d51-02f5-488a-80f3-0b621e7c317a"/>
-    <ds:schemaRef ds:uri="1f168f81-3f83-4b33-9f0c-ec152bce3f98"/>
-    <ds:schemaRef ds:uri="http://schemas.microsoft.com/office/2006/metadata/properties"/>
-  </ds:schemaRefs>
-</ds:datastoreItem>
-</file>
-
-<file path=customXml/itemProps2.xml><?xml version="1.0" encoding="utf-8"?>
 <ds:datastoreItem xmlns:ds="http://schemas.openxmlformats.org/officeDocument/2006/customXml" ds:itemID="{ED87D459-01C6-46F3-85EB-8A8AB455C67D}">
   <ds:schemaRefs>
     <ds:schemaRef ds:uri="http://schemas.microsoft.com/office/2006/metadata/contentType"/>
@@ -25721,6 +25840,23 @@
 </ds:datastoreItem>
 </file>
 
+<file path=customXml/itemProps2.xml><?xml version="1.0" encoding="utf-8"?>
+<ds:datastoreItem xmlns:ds="http://schemas.openxmlformats.org/officeDocument/2006/customXml" ds:itemID="{7972C250-C430-4380-B8BD-02E395B67AF0}">
+  <ds:schemaRefs>
+    <ds:schemaRef ds:uri="http://purl.org/dc/dcmitype/"/>
+    <ds:schemaRef ds:uri="http://purl.org/dc/terms/"/>
+    <ds:schemaRef ds:uri="http://schemas.openxmlformats.org/package/2006/metadata/core-properties"/>
+    <ds:schemaRef ds:uri="http://schemas.microsoft.com/office/2006/documentManagement/types"/>
+    <ds:schemaRef ds:uri="http://www.w3.org/XML/1998/namespace"/>
+    <ds:schemaRef ds:uri="http://schemas.microsoft.com/office/infopath/2007/PartnerControls"/>
+    <ds:schemaRef ds:uri="http://purl.org/dc/elements/1.1/"/>
+    <ds:schemaRef ds:uri="86822d51-02f5-488a-80f3-0b621e7c317a"/>
+    <ds:schemaRef ds:uri="1f168f81-3f83-4b33-9f0c-ec152bce3f98"/>
+    <ds:schemaRef ds:uri="http://schemas.microsoft.com/office/2006/metadata/properties"/>
+  </ds:schemaRefs>
+</ds:datastoreItem>
+</file>
+
 <file path=customXml/itemProps3.xml><?xml version="1.0" encoding="utf-8"?>
 <ds:datastoreItem xmlns:ds="http://schemas.openxmlformats.org/officeDocument/2006/customXml" ds:itemID="{E12B114C-EB44-46E6-930B-B69E30F6F9AE}">
   <ds:schemaRefs>

</xml_diff>

<commit_message>
Adicionando tópicos do gameiro
</commit_message>
<xml_diff>
--- a/MONITORAMENTO/Documentação/PPTs/Cold Stock Apresentação - Sprint 2.pptx
+++ b/MONITORAMENTO/Documentação/PPTs/Cold Stock Apresentação - Sprint 2.pptx
@@ -3061,16 +3061,7 @@
                 </a:solidFill>
                 <a:latin typeface="Montserrat" panose="00000500000000000000" pitchFamily="2" charset="0"/>
               </a:rPr>
-              <a:t>Giovanna de </a:t>
-            </a:r>
-            <a:r>
-              <a:rPr lang="pt-BR" sz="1600" dirty="0" smtClean="0">
-                <a:solidFill>
-                  <a:srgbClr val="3AAFA9"/>
-                </a:solidFill>
-                <a:latin typeface="Montserrat" panose="00000500000000000000" pitchFamily="2" charset="0"/>
-              </a:rPr>
-              <a:t>Jesus</a:t>
+              <a:t>Giovanna de Jesus</a:t>
             </a:r>
           </a:p>
           <a:p>
@@ -3101,7 +3092,7 @@
           </a:p>
           <a:p>
             <a:r>
-              <a:rPr lang="pt-BR" sz="1600" dirty="0" smtClean="0">
+              <a:rPr lang="pt-BR" sz="1600" dirty="0">
                 <a:solidFill>
                   <a:srgbClr val="3AAFA9"/>
                 </a:solidFill>
@@ -3109,12 +3100,6 @@
               </a:rPr>
               <a:t>Victor Vicente</a:t>
             </a:r>
-            <a:endParaRPr lang="pt-BR" sz="1600" dirty="0">
-              <a:solidFill>
-                <a:srgbClr val="3AAFA9"/>
-              </a:solidFill>
-              <a:latin typeface="Montserrat" panose="00000500000000000000" pitchFamily="2" charset="0"/>
-            </a:endParaRPr>
           </a:p>
         </p:txBody>
       </p:sp>
@@ -3321,7 +3306,7 @@
                     <a14:useLocalDpi xmlns:a14="http://schemas.microsoft.com/office/drawing/2010/main" val="0"/>
                   </a:ext>
                   <a:ext uri="{96DAC541-7B7A-43D3-8B79-37D633B846F1}">
-                    <asvg:svgBlip xmlns="" xmlns:asvg="http://schemas.microsoft.com/office/drawing/2016/SVG/main" r:embed="rId3"/>
+                    <asvg:svgBlip xmlns:asvg="http://schemas.microsoft.com/office/drawing/2016/SVG/main" r:embed="rId3"/>
                   </a:ext>
                 </a:extLst>
               </a:blip>
@@ -3376,25 +3361,7 @@
                 </a:solidFill>
                 <a:latin typeface="Montserrat" panose="00000500000000000000" pitchFamily="2" charset="0"/>
               </a:rPr>
-              <a:t>Sprint </a:t>
-            </a:r>
-            <a:r>
-              <a:rPr lang="pt-BR" sz="2400" dirty="0" smtClean="0">
-                <a:solidFill>
-                  <a:srgbClr val="3AAFA9"/>
-                </a:solidFill>
-                <a:latin typeface="Montserrat" panose="00000500000000000000" pitchFamily="2" charset="0"/>
-              </a:rPr>
-              <a:t>2 </a:t>
-            </a:r>
-            <a:r>
-              <a:rPr lang="pt-BR" sz="2400" dirty="0">
-                <a:solidFill>
-                  <a:srgbClr val="3AAFA9"/>
-                </a:solidFill>
-                <a:latin typeface="Montserrat" panose="00000500000000000000" pitchFamily="2" charset="0"/>
-              </a:rPr>
-              <a:t>– CCO</a:t>
+              <a:t>Sprint 2 – CCO</a:t>
             </a:r>
           </a:p>
           <a:p>
@@ -4102,7 +4069,7 @@
             <a:p>
               <a:pPr algn="ctr"/>
               <a:r>
-                <a:rPr lang="pt-BR" sz="5400" dirty="0" smtClean="0">
+                <a:rPr lang="pt-BR" sz="5400" dirty="0">
                   <a:solidFill>
                     <a:srgbClr val="3AAFA9"/>
                   </a:solidFill>
@@ -4110,12 +4077,6 @@
                 </a:rPr>
                 <a:t>Protótipo Máquinas</a:t>
               </a:r>
-              <a:endParaRPr lang="pt-BR" sz="5400" dirty="0">
-                <a:solidFill>
-                  <a:srgbClr val="3AAFA9"/>
-                </a:solidFill>
-                <a:latin typeface="Montserrat SemiBold" panose="00000700000000000000" pitchFamily="2" charset="0"/>
-              </a:endParaRPr>
             </a:p>
           </p:txBody>
         </p:sp>
@@ -4244,7 +4205,7 @@
                     <a14:useLocalDpi xmlns:a14="http://schemas.microsoft.com/office/drawing/2010/main" val="0"/>
                   </a:ext>
                   <a:ext uri="{96DAC541-7B7A-43D3-8B79-37D633B846F1}">
-                    <asvg:svgBlip xmlns="" xmlns:asvg="http://schemas.microsoft.com/office/drawing/2016/SVG/main" r:embed="rId3"/>
+                    <asvg:svgBlip xmlns:asvg="http://schemas.microsoft.com/office/drawing/2016/SVG/main" r:embed="rId3"/>
                   </a:ext>
                 </a:extLst>
               </a:blip>
@@ -4834,7 +4795,7 @@
                     <a14:useLocalDpi xmlns:a14="http://schemas.microsoft.com/office/drawing/2010/main" val="0"/>
                   </a:ext>
                   <a:ext uri="{96DAC541-7B7A-43D3-8B79-37D633B846F1}">
-                    <asvg:svgBlip xmlns="" xmlns:asvg="http://schemas.microsoft.com/office/drawing/2016/SVG/main" r:embed="rId3"/>
+                    <asvg:svgBlip xmlns:asvg="http://schemas.microsoft.com/office/drawing/2016/SVG/main" r:embed="rId3"/>
                   </a:ext>
                 </a:extLst>
               </a:blip>
@@ -5365,7 +5326,7 @@
             <a:p>
               <a:pPr algn="ctr"/>
               <a:r>
-                <a:rPr lang="pt-BR" sz="5400" dirty="0" err="1" smtClean="0">
+                <a:rPr lang="pt-BR" sz="5400" dirty="0" err="1">
                   <a:solidFill>
                     <a:srgbClr val="3AAFA9"/>
                   </a:solidFill>
@@ -5507,7 +5468,7 @@
                     <a14:useLocalDpi xmlns:a14="http://schemas.microsoft.com/office/drawing/2010/main" val="0"/>
                   </a:ext>
                   <a:ext uri="{96DAC541-7B7A-43D3-8B79-37D633B846F1}">
-                    <asvg:svgBlip xmlns="" xmlns:asvg="http://schemas.microsoft.com/office/drawing/2016/SVG/main" r:embed="rId3"/>
+                    <asvg:svgBlip xmlns:asvg="http://schemas.microsoft.com/office/drawing/2016/SVG/main" r:embed="rId3"/>
                   </a:ext>
                 </a:extLst>
               </a:blip>
@@ -5762,13 +5723,13 @@
           <a:p>
             <a:pPr algn="ctr"/>
             <a:r>
-              <a:rPr lang="pt-BR" sz="1600" b="1" dirty="0" smtClean="0">
+              <a:rPr lang="pt-BR" sz="1600" b="1" dirty="0">
                 <a:latin typeface="Montserrat" panose="00000500000000000000" pitchFamily="2" charset="0"/>
               </a:rPr>
               <a:t>API </a:t>
             </a:r>
             <a:r>
-              <a:rPr lang="pt-BR" sz="1600" b="1" dirty="0" err="1" smtClean="0">
+              <a:rPr lang="pt-BR" sz="1600" b="1" dirty="0" err="1">
                 <a:latin typeface="Montserrat" panose="00000500000000000000" pitchFamily="2" charset="0"/>
               </a:rPr>
               <a:t>psutil</a:t>
@@ -5912,7 +5873,7 @@
           <a:p>
             <a:pPr algn="ctr"/>
             <a:r>
-              <a:rPr lang="pt-BR" sz="1600" b="1" dirty="0" smtClean="0">
+              <a:rPr lang="pt-BR" sz="1600" b="1" dirty="0">
                 <a:latin typeface="Montserrat" panose="00000500000000000000" pitchFamily="2" charset="0"/>
               </a:rPr>
               <a:t>Automatizações</a:t>
@@ -5955,14 +5916,11 @@
           <a:p>
             <a:pPr algn="ctr"/>
             <a:r>
-              <a:rPr lang="pt-BR" sz="1600" b="1" dirty="0" smtClean="0">
+              <a:rPr lang="pt-BR" sz="1600" b="1" dirty="0">
                 <a:latin typeface="Montserrat" panose="00000500000000000000" pitchFamily="2" charset="0"/>
               </a:rPr>
               <a:t>API OHM</a:t>
             </a:r>
-            <a:endParaRPr lang="pt-BR" sz="1600" b="1" dirty="0">
-              <a:latin typeface="Montserrat" panose="00000500000000000000" pitchFamily="2" charset="0"/>
-            </a:endParaRPr>
           </a:p>
         </p:txBody>
       </p:sp>
@@ -7367,7 +7325,7 @@
           <a:p>
             <a:pPr algn="ctr"/>
             <a:r>
-              <a:rPr lang="pt-BR" sz="4800" dirty="0" smtClean="0">
+              <a:rPr lang="pt-BR" sz="4800" dirty="0">
                 <a:solidFill>
                   <a:srgbClr val="2B7A78"/>
                 </a:solidFill>
@@ -7500,7 +7458,7 @@
                 <a14:useLocalDpi xmlns:a14="http://schemas.microsoft.com/office/drawing/2010/main" val="0"/>
               </a:ext>
               <a:ext uri="{96DAC541-7B7A-43D3-8B79-37D633B846F1}">
-                <asvg:svgBlip xmlns="" xmlns:asvg="http://schemas.microsoft.com/office/drawing/2016/SVG/main" r:embed="rId4"/>
+                <asvg:svgBlip xmlns:asvg="http://schemas.microsoft.com/office/drawing/2016/SVG/main" r:embed="rId4"/>
               </a:ext>
             </a:extLst>
           </a:blip>
@@ -7714,7 +7672,7 @@
           <a:lstStyle/>
           <a:p>
             <a:r>
-              <a:rPr lang="pt-BR" sz="2000" dirty="0" err="1" smtClean="0">
+              <a:rPr lang="pt-BR" sz="2000" dirty="0" err="1">
                 <a:solidFill>
                   <a:srgbClr val="F1F6FB"/>
                 </a:solidFill>
@@ -7994,7 +7952,7 @@
           <a:lstStyle/>
           <a:p>
             <a:r>
-              <a:rPr lang="pt-BR" sz="2000" dirty="0" smtClean="0">
+              <a:rPr lang="pt-BR" sz="2000" dirty="0">
                 <a:solidFill>
                   <a:srgbClr val="F1F6FB"/>
                 </a:solidFill>
@@ -8002,12 +7960,6 @@
               </a:rPr>
               <a:t>Máquinas</a:t>
             </a:r>
-            <a:endParaRPr lang="pt-BR" sz="2000" dirty="0">
-              <a:solidFill>
-                <a:srgbClr val="F1F6FB"/>
-              </a:solidFill>
-              <a:latin typeface="Eras Medium ITC" panose="020B0602030504020804" pitchFamily="34" charset="0"/>
-            </a:endParaRPr>
           </a:p>
         </p:txBody>
       </p:sp>
@@ -9108,7 +9060,7 @@
             <a:p>
               <a:pPr algn="ctr"/>
               <a:r>
-                <a:rPr lang="pt-BR" sz="5400" dirty="0" smtClean="0">
+                <a:rPr lang="pt-BR" sz="5400" dirty="0">
                   <a:solidFill>
                     <a:srgbClr val="3AAFA9"/>
                   </a:solidFill>
@@ -9116,12 +9068,6 @@
                 </a:rPr>
                 <a:t>AWS</a:t>
               </a:r>
-              <a:endParaRPr lang="pt-BR" sz="5400" dirty="0">
-                <a:solidFill>
-                  <a:srgbClr val="3AAFA9"/>
-                </a:solidFill>
-                <a:latin typeface="Montserrat SemiBold" panose="00000700000000000000" pitchFamily="2" charset="0"/>
-              </a:endParaRPr>
             </a:p>
           </p:txBody>
         </p:sp>
@@ -9250,7 +9196,7 @@
                     <a14:useLocalDpi xmlns:a14="http://schemas.microsoft.com/office/drawing/2010/main" val="0"/>
                   </a:ext>
                   <a:ext uri="{96DAC541-7B7A-43D3-8B79-37D633B846F1}">
-                    <asvg:svgBlip xmlns="" xmlns:asvg="http://schemas.microsoft.com/office/drawing/2016/SVG/main" r:embed="rId3"/>
+                    <asvg:svgBlip xmlns:asvg="http://schemas.microsoft.com/office/drawing/2016/SVG/main" r:embed="rId3"/>
                   </a:ext>
                 </a:extLst>
               </a:blip>
@@ -9421,6 +9367,263 @@
           <a:p>
             <a:pPr algn="ctr"/>
             <a:endParaRPr lang="pt-BR"/>
+          </a:p>
+        </p:txBody>
+      </p:sp>
+      <p:pic>
+        <p:nvPicPr>
+          <p:cNvPr id="3" name="Gráfico 2" descr="Pato de borracha">
+            <a:extLst>
+              <a:ext uri="{FF2B5EF4-FFF2-40B4-BE49-F238E27FC236}">
+                <a16:creationId xmlns:a16="http://schemas.microsoft.com/office/drawing/2014/main" id="{EECB52C2-FCB4-458B-8DDB-90444923E66C}"/>
+              </a:ext>
+            </a:extLst>
+          </p:cNvPr>
+          <p:cNvPicPr>
+            <a:picLocks noChangeAspect="1"/>
+          </p:cNvPicPr>
+          <p:nvPr/>
+        </p:nvPicPr>
+        <p:blipFill>
+          <a:blip r:embed="rId5">
+            <a:extLst>
+              <a:ext uri="{28A0092B-C50C-407E-A947-70E740481C1C}">
+                <a14:useLocalDpi xmlns:a14="http://schemas.microsoft.com/office/drawing/2010/main" val="0"/>
+              </a:ext>
+              <a:ext uri="{96DAC541-7B7A-43D3-8B79-37D633B846F1}">
+                <asvg:svgBlip xmlns:asvg="http://schemas.microsoft.com/office/drawing/2016/SVG/main" r:embed="rId6"/>
+              </a:ext>
+            </a:extLst>
+          </a:blip>
+          <a:stretch>
+            <a:fillRect/>
+          </a:stretch>
+        </p:blipFill>
+        <p:spPr>
+          <a:xfrm>
+            <a:off x="1437473" y="1801120"/>
+            <a:ext cx="914400" cy="914400"/>
+          </a:xfrm>
+          <a:prstGeom prst="rect">
+            <a:avLst/>
+          </a:prstGeom>
+        </p:spPr>
+      </p:pic>
+      <p:pic>
+        <p:nvPicPr>
+          <p:cNvPr id="14" name="Gráfico 13" descr="África">
+            <a:extLst>
+              <a:ext uri="{FF2B5EF4-FFF2-40B4-BE49-F238E27FC236}">
+                <a16:creationId xmlns:a16="http://schemas.microsoft.com/office/drawing/2014/main" id="{CD240FE6-2386-42D8-A0A6-D7CC1F42F2AB}"/>
+              </a:ext>
+            </a:extLst>
+          </p:cNvPr>
+          <p:cNvPicPr>
+            <a:picLocks noChangeAspect="1"/>
+          </p:cNvPicPr>
+          <p:nvPr/>
+        </p:nvPicPr>
+        <p:blipFill>
+          <a:blip r:embed="rId7">
+            <a:extLst>
+              <a:ext uri="{28A0092B-C50C-407E-A947-70E740481C1C}">
+                <a14:useLocalDpi xmlns:a14="http://schemas.microsoft.com/office/drawing/2010/main" val="0"/>
+              </a:ext>
+              <a:ext uri="{96DAC541-7B7A-43D3-8B79-37D633B846F1}">
+                <asvg:svgBlip xmlns:asvg="http://schemas.microsoft.com/office/drawing/2016/SVG/main" r:embed="rId8"/>
+              </a:ext>
+            </a:extLst>
+          </a:blip>
+          <a:stretch>
+            <a:fillRect/>
+          </a:stretch>
+        </p:blipFill>
+        <p:spPr>
+          <a:xfrm>
+            <a:off x="1437473" y="4132050"/>
+            <a:ext cx="914400" cy="914400"/>
+          </a:xfrm>
+          <a:prstGeom prst="rect">
+            <a:avLst/>
+          </a:prstGeom>
+        </p:spPr>
+      </p:pic>
+      <p:pic>
+        <p:nvPicPr>
+          <p:cNvPr id="16" name="Gráfico 15" descr="Rosto alienígena">
+            <a:extLst>
+              <a:ext uri="{FF2B5EF4-FFF2-40B4-BE49-F238E27FC236}">
+                <a16:creationId xmlns:a16="http://schemas.microsoft.com/office/drawing/2014/main" id="{71901AAC-3748-4B03-8E99-2A778D28AB5B}"/>
+              </a:ext>
+            </a:extLst>
+          </p:cNvPr>
+          <p:cNvPicPr>
+            <a:picLocks noChangeAspect="1"/>
+          </p:cNvPicPr>
+          <p:nvPr/>
+        </p:nvPicPr>
+        <p:blipFill>
+          <a:blip r:embed="rId9">
+            <a:extLst>
+              <a:ext uri="{28A0092B-C50C-407E-A947-70E740481C1C}">
+                <a14:useLocalDpi xmlns:a14="http://schemas.microsoft.com/office/drawing/2010/main" val="0"/>
+              </a:ext>
+              <a:ext uri="{96DAC541-7B7A-43D3-8B79-37D633B846F1}">
+                <asvg:svgBlip xmlns:asvg="http://schemas.microsoft.com/office/drawing/2016/SVG/main" r:embed="rId10"/>
+              </a:ext>
+            </a:extLst>
+          </a:blip>
+          <a:stretch>
+            <a:fillRect/>
+          </a:stretch>
+        </p:blipFill>
+        <p:spPr>
+          <a:xfrm>
+            <a:off x="1437473" y="2966585"/>
+            <a:ext cx="914400" cy="914400"/>
+          </a:xfrm>
+          <a:prstGeom prst="rect">
+            <a:avLst/>
+          </a:prstGeom>
+        </p:spPr>
+      </p:pic>
+      <p:sp>
+        <p:nvSpPr>
+          <p:cNvPr id="17" name="CaixaDeTexto 16">
+            <a:extLst>
+              <a:ext uri="{FF2B5EF4-FFF2-40B4-BE49-F238E27FC236}">
+                <a16:creationId xmlns:a16="http://schemas.microsoft.com/office/drawing/2014/main" id="{2A76F44E-9C8F-4790-95B7-1CAA9874B0B3}"/>
+              </a:ext>
+            </a:extLst>
+          </p:cNvPr>
+          <p:cNvSpPr txBox="1"/>
+          <p:nvPr/>
+        </p:nvSpPr>
+        <p:spPr>
+          <a:xfrm>
+            <a:off x="2473693" y="1801120"/>
+            <a:ext cx="7575082" cy="923330"/>
+          </a:xfrm>
+          <a:prstGeom prst="rect">
+            <a:avLst/>
+          </a:prstGeom>
+          <a:noFill/>
+        </p:spPr>
+        <p:txBody>
+          <a:bodyPr wrap="square" rtlCol="0">
+            <a:spAutoFit/>
+          </a:bodyPr>
+          <a:lstStyle/>
+          <a:p>
+            <a:r>
+              <a:rPr lang="pt-BR" dirty="0">
+                <a:sym typeface="Wingdings" panose="05000000000000000000" pitchFamily="2" charset="2"/>
+              </a:rPr>
+              <a:t> </a:t>
+            </a:r>
+            <a:r>
+              <a:rPr lang="pt-BR" dirty="0"/>
+              <a:t>Nós temos então nos preparado para aplicar na nuvem </a:t>
+            </a:r>
+            <a:r>
+              <a:rPr lang="pt-BR" dirty="0" err="1"/>
+              <a:t>aws</a:t>
+            </a:r>
+            <a:r>
+              <a:rPr lang="pt-BR" dirty="0"/>
+              <a:t> em que se localiza nosso projeto legado, a nossa aplicação de monitoramento. Com armazenamento local.</a:t>
+            </a:r>
+          </a:p>
+        </p:txBody>
+      </p:sp>
+      <p:sp>
+        <p:nvSpPr>
+          <p:cNvPr id="19" name="CaixaDeTexto 18">
+            <a:extLst>
+              <a:ext uri="{FF2B5EF4-FFF2-40B4-BE49-F238E27FC236}">
+                <a16:creationId xmlns:a16="http://schemas.microsoft.com/office/drawing/2014/main" id="{3F0BEE90-7452-4AAC-82A7-77ABCBD23705}"/>
+              </a:ext>
+            </a:extLst>
+          </p:cNvPr>
+          <p:cNvSpPr txBox="1"/>
+          <p:nvPr/>
+        </p:nvSpPr>
+        <p:spPr>
+          <a:xfrm>
+            <a:off x="2472089" y="3050371"/>
+            <a:ext cx="7575082" cy="646331"/>
+          </a:xfrm>
+          <a:prstGeom prst="rect">
+            <a:avLst/>
+          </a:prstGeom>
+          <a:noFill/>
+        </p:spPr>
+        <p:txBody>
+          <a:bodyPr wrap="square" rtlCol="0">
+            <a:spAutoFit/>
+          </a:bodyPr>
+          <a:lstStyle/>
+          <a:p>
+            <a:r>
+              <a:rPr lang="pt-BR" dirty="0">
+                <a:sym typeface="Wingdings" panose="05000000000000000000" pitchFamily="2" charset="2"/>
+              </a:rPr>
+              <a:t> </a:t>
+            </a:r>
+            <a:r>
+              <a:rPr lang="pt-BR" dirty="0"/>
+              <a:t>Para uma funcionalidade garantida do nosso monitoramento e da aplicação legado, nós estamos executando tudo em ambientes virtuais. </a:t>
+            </a:r>
+          </a:p>
+        </p:txBody>
+      </p:sp>
+      <p:sp>
+        <p:nvSpPr>
+          <p:cNvPr id="23" name="CaixaDeTexto 22">
+            <a:extLst>
+              <a:ext uri="{FF2B5EF4-FFF2-40B4-BE49-F238E27FC236}">
+                <a16:creationId xmlns:a16="http://schemas.microsoft.com/office/drawing/2014/main" id="{091279C1-4C40-4985-A991-F6BEE5E0B215}"/>
+              </a:ext>
+            </a:extLst>
+          </p:cNvPr>
+          <p:cNvSpPr txBox="1"/>
+          <p:nvPr/>
+        </p:nvSpPr>
+        <p:spPr>
+          <a:xfrm>
+            <a:off x="2472089" y="4132050"/>
+            <a:ext cx="7575082" cy="369332"/>
+          </a:xfrm>
+          <a:prstGeom prst="rect">
+            <a:avLst/>
+          </a:prstGeom>
+          <a:noFill/>
+        </p:spPr>
+        <p:txBody>
+          <a:bodyPr wrap="square" rtlCol="0">
+            <a:spAutoFit/>
+          </a:bodyPr>
+          <a:lstStyle/>
+          <a:p>
+            <a:r>
+              <a:rPr lang="pt-BR" dirty="0">
+                <a:sym typeface="Wingdings" panose="05000000000000000000" pitchFamily="2" charset="2"/>
+              </a:rPr>
+              <a:t> Aplicação </a:t>
+            </a:r>
+            <a:r>
+              <a:rPr lang="pt-BR" dirty="0" err="1">
+                <a:sym typeface="Wingdings" panose="05000000000000000000" pitchFamily="2" charset="2"/>
+              </a:rPr>
+              <a:t>java</a:t>
+            </a:r>
+            <a:r>
+              <a:rPr lang="pt-BR" dirty="0">
+                <a:sym typeface="Wingdings" panose="05000000000000000000" pitchFamily="2" charset="2"/>
+              </a:rPr>
+              <a:t> para consulta local.</a:t>
+            </a:r>
+            <a:endParaRPr lang="pt-BR" dirty="0"/>
           </a:p>
         </p:txBody>
       </p:sp>
@@ -9711,7 +9914,7 @@
           <a:p>
             <a:pPr algn="ctr"/>
             <a:r>
-              <a:rPr lang="pt-BR" sz="4800" dirty="0" smtClean="0">
+              <a:rPr lang="pt-BR" sz="4800" dirty="0">
                 <a:solidFill>
                   <a:srgbClr val="2B7A78"/>
                 </a:solidFill>
@@ -9844,7 +10047,7 @@
                 <a14:useLocalDpi xmlns:a14="http://schemas.microsoft.com/office/drawing/2010/main" val="0"/>
               </a:ext>
               <a:ext uri="{96DAC541-7B7A-43D3-8B79-37D633B846F1}">
-                <asvg:svgBlip xmlns="" xmlns:asvg="http://schemas.microsoft.com/office/drawing/2016/SVG/main" r:embed="rId4"/>
+                <asvg:svgBlip xmlns:asvg="http://schemas.microsoft.com/office/drawing/2016/SVG/main" r:embed="rId4"/>
               </a:ext>
             </a:extLst>
           </a:blip>
@@ -10058,7 +10261,7 @@
           <a:lstStyle/>
           <a:p>
             <a:r>
-              <a:rPr lang="pt-BR" sz="2000" dirty="0" smtClean="0">
+              <a:rPr lang="pt-BR" sz="2000" dirty="0">
                 <a:solidFill>
                   <a:srgbClr val="F1F6FB"/>
                 </a:solidFill>
@@ -10066,12 +10269,6 @@
               </a:rPr>
               <a:t>Qual é?</a:t>
             </a:r>
-            <a:endParaRPr lang="pt-BR" sz="2000" dirty="0">
-              <a:solidFill>
-                <a:srgbClr val="F1F6FB"/>
-              </a:solidFill>
-              <a:latin typeface="Eras Medium ITC" panose="020B0602030504020804" pitchFamily="34" charset="0"/>
-            </a:endParaRPr>
           </a:p>
         </p:txBody>
       </p:sp>
@@ -10338,7 +10535,7 @@
           <a:lstStyle/>
           <a:p>
             <a:r>
-              <a:rPr lang="pt-BR" sz="2000" dirty="0" smtClean="0">
+              <a:rPr lang="pt-BR" sz="2000" dirty="0">
                 <a:solidFill>
                   <a:srgbClr val="F1F6FB"/>
                 </a:solidFill>
@@ -10347,7 +10544,7 @@
               <a:t>Chat </a:t>
             </a:r>
             <a:r>
-              <a:rPr lang="pt-BR" sz="2000" dirty="0" err="1" smtClean="0">
+              <a:rPr lang="pt-BR" sz="2000" dirty="0" err="1">
                 <a:solidFill>
                   <a:srgbClr val="F1F6FB"/>
                 </a:solidFill>
@@ -10627,7 +10824,7 @@
           <a:lstStyle/>
           <a:p>
             <a:r>
-              <a:rPr lang="pt-BR" sz="2000" dirty="0" smtClean="0">
+              <a:rPr lang="pt-BR" sz="2000" dirty="0">
                 <a:solidFill>
                   <a:srgbClr val="F1F6FB"/>
                 </a:solidFill>
@@ -10635,12 +10832,6 @@
               </a:rPr>
               <a:t>Árvore de decisões</a:t>
             </a:r>
-            <a:endParaRPr lang="pt-BR" sz="2000" dirty="0">
-              <a:solidFill>
-                <a:srgbClr val="F1F6FB"/>
-              </a:solidFill>
-              <a:latin typeface="Eras Medium ITC" panose="020B0602030504020804" pitchFamily="34" charset="0"/>
-            </a:endParaRPr>
           </a:p>
         </p:txBody>
       </p:sp>
@@ -12192,7 +12383,7 @@
             <a:p>
               <a:pPr algn="ctr"/>
               <a:r>
-                <a:rPr lang="pt-BR" sz="5400" dirty="0" smtClean="0">
+                <a:rPr lang="pt-BR" sz="5400" dirty="0">
                   <a:solidFill>
                     <a:srgbClr val="3AAFA9"/>
                   </a:solidFill>
@@ -12200,12 +12391,6 @@
                 </a:rPr>
                 <a:t>Árvore de decisões</a:t>
               </a:r>
-              <a:endParaRPr lang="pt-BR" sz="5400" dirty="0">
-                <a:solidFill>
-                  <a:srgbClr val="3AAFA9"/>
-                </a:solidFill>
-                <a:latin typeface="Montserrat SemiBold" panose="00000700000000000000" pitchFamily="2" charset="0"/>
-              </a:endParaRPr>
             </a:p>
           </p:txBody>
         </p:sp>
@@ -12334,7 +12519,7 @@
                     <a14:useLocalDpi xmlns:a14="http://schemas.microsoft.com/office/drawing/2010/main" val="0"/>
                   </a:ext>
                   <a:ext uri="{96DAC541-7B7A-43D3-8B79-37D633B846F1}">
-                    <asvg:svgBlip xmlns="" xmlns:asvg="http://schemas.microsoft.com/office/drawing/2016/SVG/main" r:embed="rId3"/>
+                    <asvg:svgBlip xmlns:asvg="http://schemas.microsoft.com/office/drawing/2016/SVG/main" r:embed="rId3"/>
                   </a:ext>
                 </a:extLst>
               </a:blip>
@@ -12797,7 +12982,7 @@
             <a:p>
               <a:pPr algn="ctr"/>
               <a:r>
-                <a:rPr lang="pt-BR" sz="5400" dirty="0" smtClean="0">
+                <a:rPr lang="pt-BR" sz="5400" dirty="0">
                   <a:solidFill>
                     <a:srgbClr val="3AAFA9"/>
                   </a:solidFill>
@@ -12805,12 +12990,6 @@
                 </a:rPr>
                 <a:t>Máquinas</a:t>
               </a:r>
-              <a:endParaRPr lang="pt-BR" sz="5400" dirty="0">
-                <a:solidFill>
-                  <a:srgbClr val="3AAFA9"/>
-                </a:solidFill>
-                <a:latin typeface="Montserrat SemiBold" panose="00000700000000000000" pitchFamily="2" charset="0"/>
-              </a:endParaRPr>
             </a:p>
           </p:txBody>
         </p:sp>
@@ -12939,7 +13118,7 @@
                     <a14:useLocalDpi xmlns:a14="http://schemas.microsoft.com/office/drawing/2010/main" val="0"/>
                   </a:ext>
                   <a:ext uri="{96DAC541-7B7A-43D3-8B79-37D633B846F1}">
-                    <asvg:svgBlip xmlns="" xmlns:asvg="http://schemas.microsoft.com/office/drawing/2016/SVG/main" r:embed="rId3"/>
+                    <asvg:svgBlip xmlns:asvg="http://schemas.microsoft.com/office/drawing/2016/SVG/main" r:embed="rId3"/>
                   </a:ext>
                 </a:extLst>
               </a:blip>
@@ -13402,7 +13581,7 @@
             <a:p>
               <a:pPr algn="ctr"/>
               <a:r>
-                <a:rPr lang="pt-BR" sz="5400" dirty="0" smtClean="0">
+                <a:rPr lang="pt-BR" sz="5400" dirty="0">
                   <a:solidFill>
                     <a:srgbClr val="3AAFA9"/>
                   </a:solidFill>
@@ -13410,12 +13589,6 @@
                 </a:rPr>
                 <a:t>Suporte</a:t>
               </a:r>
-              <a:endParaRPr lang="pt-BR" sz="5400" dirty="0">
-                <a:solidFill>
-                  <a:srgbClr val="3AAFA9"/>
-                </a:solidFill>
-                <a:latin typeface="Montserrat SemiBold" panose="00000700000000000000" pitchFamily="2" charset="0"/>
-              </a:endParaRPr>
             </a:p>
           </p:txBody>
         </p:sp>
@@ -13544,7 +13717,7 @@
                     <a14:useLocalDpi xmlns:a14="http://schemas.microsoft.com/office/drawing/2010/main" val="0"/>
                   </a:ext>
                   <a:ext uri="{96DAC541-7B7A-43D3-8B79-37D633B846F1}">
-                    <asvg:svgBlip xmlns="" xmlns:asvg="http://schemas.microsoft.com/office/drawing/2016/SVG/main" r:embed="rId3"/>
+                    <asvg:svgBlip xmlns:asvg="http://schemas.microsoft.com/office/drawing/2016/SVG/main" r:embed="rId3"/>
                   </a:ext>
                 </a:extLst>
               </a:blip>
@@ -14829,7 +15002,7 @@
                 <a14:useLocalDpi xmlns:a14="http://schemas.microsoft.com/office/drawing/2010/main" val="0"/>
               </a:ext>
               <a:ext uri="{96DAC541-7B7A-43D3-8B79-37D633B846F1}">
-                <asvg:svgBlip xmlns="" xmlns:asvg="http://schemas.microsoft.com/office/drawing/2016/SVG/main" r:embed="rId4"/>
+                <asvg:svgBlip xmlns:asvg="http://schemas.microsoft.com/office/drawing/2016/SVG/main" r:embed="rId4"/>
               </a:ext>
             </a:extLst>
           </a:blip>
@@ -15043,7 +15216,7 @@
           <a:lstStyle/>
           <a:p>
             <a:r>
-              <a:rPr lang="pt-BR" sz="2000" dirty="0" smtClean="0">
+              <a:rPr lang="pt-BR" sz="2000" dirty="0">
                 <a:solidFill>
                   <a:srgbClr val="F1F6FB"/>
                 </a:solidFill>
@@ -15051,12 +15224,6 @@
               </a:rPr>
               <a:t>Geladeiras</a:t>
             </a:r>
-            <a:endParaRPr lang="pt-BR" sz="2000" dirty="0">
-              <a:solidFill>
-                <a:srgbClr val="F1F6FB"/>
-              </a:solidFill>
-              <a:latin typeface="Eras Medium ITC" panose="020B0602030504020804" pitchFamily="34" charset="0"/>
-            </a:endParaRPr>
           </a:p>
         </p:txBody>
       </p:sp>
@@ -15323,7 +15490,7 @@
           <a:lstStyle/>
           <a:p>
             <a:r>
-              <a:rPr lang="pt-BR" sz="2000" dirty="0" smtClean="0">
+              <a:rPr lang="pt-BR" sz="2000" dirty="0">
                 <a:solidFill>
                   <a:srgbClr val="F1F6FB"/>
                 </a:solidFill>
@@ -15331,12 +15498,6 @@
               </a:rPr>
               <a:t>Monitoramento</a:t>
             </a:r>
-            <a:endParaRPr lang="pt-BR" sz="2000" dirty="0">
-              <a:solidFill>
-                <a:srgbClr val="F1F6FB"/>
-              </a:solidFill>
-              <a:latin typeface="Eras Medium ITC" panose="020B0602030504020804" pitchFamily="34" charset="0"/>
-            </a:endParaRPr>
           </a:p>
         </p:txBody>
       </p:sp>
@@ -15603,7 +15764,7 @@
           <a:lstStyle/>
           <a:p>
             <a:r>
-              <a:rPr lang="pt-BR" sz="2000" dirty="0" smtClean="0">
+              <a:rPr lang="pt-BR" sz="2000" dirty="0">
                 <a:solidFill>
                   <a:srgbClr val="F1F6FB"/>
                 </a:solidFill>
@@ -15611,12 +15772,6 @@
               </a:rPr>
               <a:t>Novas tecnologias</a:t>
             </a:r>
-            <a:endParaRPr lang="pt-BR" sz="2000" dirty="0">
-              <a:solidFill>
-                <a:srgbClr val="F1F6FB"/>
-              </a:solidFill>
-              <a:latin typeface="Eras Medium ITC" panose="020B0602030504020804" pitchFamily="34" charset="0"/>
-            </a:endParaRPr>
           </a:p>
         </p:txBody>
       </p:sp>
@@ -15942,7 +16097,7 @@
           <a:lstStyle/>
           <a:p>
             <a:r>
-              <a:rPr lang="pt-BR" sz="2000" dirty="0" smtClean="0">
+              <a:rPr lang="pt-BR" sz="2000" dirty="0">
                 <a:solidFill>
                   <a:srgbClr val="F1F6FB"/>
                 </a:solidFill>
@@ -15950,12 +16105,6 @@
               </a:rPr>
               <a:t>+ Clientes</a:t>
             </a:r>
-            <a:endParaRPr lang="pt-BR" sz="2000" dirty="0">
-              <a:solidFill>
-                <a:srgbClr val="F1F6FB"/>
-              </a:solidFill>
-              <a:latin typeface="Eras Medium ITC" panose="020B0602030504020804" pitchFamily="34" charset="0"/>
-            </a:endParaRPr>
           </a:p>
         </p:txBody>
       </p:sp>
@@ -17600,7 +17749,7 @@
             <a:p>
               <a:pPr algn="ctr"/>
               <a:r>
-                <a:rPr lang="pt-BR" sz="5400" dirty="0" smtClean="0">
+                <a:rPr lang="pt-BR" sz="5400" dirty="0">
                   <a:solidFill>
                     <a:srgbClr val="3AAFA9"/>
                   </a:solidFill>
@@ -17608,12 +17757,6 @@
                 </a:rPr>
                 <a:t>Diagrama de solução</a:t>
               </a:r>
-              <a:endParaRPr lang="pt-BR" sz="5400" dirty="0">
-                <a:solidFill>
-                  <a:srgbClr val="3AAFA9"/>
-                </a:solidFill>
-                <a:latin typeface="Montserrat SemiBold" panose="00000700000000000000" pitchFamily="2" charset="0"/>
-              </a:endParaRPr>
             </a:p>
           </p:txBody>
         </p:sp>
@@ -17742,7 +17885,7 @@
                     <a14:useLocalDpi xmlns:a14="http://schemas.microsoft.com/office/drawing/2010/main" val="0"/>
                   </a:ext>
                   <a:ext uri="{96DAC541-7B7A-43D3-8B79-37D633B846F1}">
-                    <asvg:svgBlip xmlns="" xmlns:asvg="http://schemas.microsoft.com/office/drawing/2016/SVG/main" r:embed="rId3"/>
+                    <asvg:svgBlip xmlns:asvg="http://schemas.microsoft.com/office/drawing/2016/SVG/main" r:embed="rId3"/>
                   </a:ext>
                 </a:extLst>
               </a:blip>
@@ -18706,20 +18849,17 @@
           <a:lstStyle/>
           <a:p>
             <a:r>
-              <a:rPr lang="pt-BR" b="1" dirty="0" smtClean="0">
+              <a:rPr lang="pt-BR" b="1" dirty="0">
                 <a:latin typeface="Montserrat" panose="00000500000000000000" pitchFamily="2" charset="0"/>
               </a:rPr>
               <a:t>API</a:t>
             </a:r>
             <a:r>
-              <a:rPr lang="pt-BR" dirty="0" smtClean="0">
+              <a:rPr lang="pt-BR" dirty="0">
                 <a:latin typeface="Montserrat" panose="00000500000000000000" pitchFamily="2" charset="0"/>
               </a:rPr>
               <a:t> </a:t>
             </a:r>
-            <a:endParaRPr lang="pt-BR" dirty="0">
-              <a:latin typeface="Montserrat" panose="00000500000000000000" pitchFamily="2" charset="0"/>
-            </a:endParaRPr>
           </a:p>
         </p:txBody>
       </p:sp>
@@ -18746,20 +18886,17 @@
           <a:lstStyle/>
           <a:p>
             <a:r>
-              <a:rPr lang="pt-BR" b="1" dirty="0" smtClean="0">
+              <a:rPr lang="pt-BR" b="1" dirty="0">
                 <a:latin typeface="Montserrat" panose="00000500000000000000" pitchFamily="2" charset="0"/>
               </a:rPr>
               <a:t>API</a:t>
             </a:r>
             <a:r>
-              <a:rPr lang="pt-BR" dirty="0" smtClean="0">
+              <a:rPr lang="pt-BR" dirty="0">
                 <a:latin typeface="Montserrat" panose="00000500000000000000" pitchFamily="2" charset="0"/>
               </a:rPr>
               <a:t> </a:t>
             </a:r>
-            <a:endParaRPr lang="pt-BR" dirty="0">
-              <a:latin typeface="Montserrat" panose="00000500000000000000" pitchFamily="2" charset="0"/>
-            </a:endParaRPr>
           </a:p>
         </p:txBody>
       </p:sp>
@@ -18786,20 +18923,17 @@
           <a:lstStyle/>
           <a:p>
             <a:r>
-              <a:rPr lang="pt-BR" b="1" dirty="0" err="1" smtClean="0">
+              <a:rPr lang="pt-BR" b="1" dirty="0" err="1">
                 <a:latin typeface="Montserrat" panose="00000500000000000000" pitchFamily="2" charset="0"/>
               </a:rPr>
               <a:t>Psutil</a:t>
             </a:r>
             <a:r>
-              <a:rPr lang="pt-BR" dirty="0" smtClean="0">
+              <a:rPr lang="pt-BR" dirty="0">
                 <a:latin typeface="Montserrat" panose="00000500000000000000" pitchFamily="2" charset="0"/>
               </a:rPr>
               <a:t> </a:t>
             </a:r>
-            <a:endParaRPr lang="pt-BR" dirty="0">
-              <a:latin typeface="Montserrat" panose="00000500000000000000" pitchFamily="2" charset="0"/>
-            </a:endParaRPr>
           </a:p>
         </p:txBody>
       </p:sp>
@@ -18826,7 +18960,7 @@
           <a:lstStyle/>
           <a:p>
             <a:r>
-              <a:rPr lang="pt-BR" b="1" dirty="0" err="1" smtClean="0">
+              <a:rPr lang="pt-BR" b="1" dirty="0" err="1">
                 <a:latin typeface="Montserrat" panose="00000500000000000000" pitchFamily="2" charset="0"/>
               </a:rPr>
               <a:t>Webcrawler</a:t>
@@ -18861,20 +18995,17 @@
           <a:p>
             <a:pPr algn="ctr"/>
             <a:r>
-              <a:rPr lang="pt-BR" b="1" dirty="0" smtClean="0">
+              <a:rPr lang="pt-BR" b="1" dirty="0">
                 <a:latin typeface="Montserrat" panose="00000500000000000000" pitchFamily="2" charset="0"/>
               </a:rPr>
               <a:t>Banco de dados</a:t>
             </a:r>
             <a:r>
-              <a:rPr lang="pt-BR" dirty="0" smtClean="0">
+              <a:rPr lang="pt-BR" dirty="0">
                 <a:latin typeface="Montserrat" panose="00000500000000000000" pitchFamily="2" charset="0"/>
               </a:rPr>
               <a:t> </a:t>
             </a:r>
-            <a:endParaRPr lang="pt-BR" dirty="0">
-              <a:latin typeface="Montserrat" panose="00000500000000000000" pitchFamily="2" charset="0"/>
-            </a:endParaRPr>
           </a:p>
         </p:txBody>
       </p:sp>
@@ -18902,7 +19033,7 @@
           <a:p>
             <a:pPr algn="ctr"/>
             <a:r>
-              <a:rPr lang="pt-BR" b="1" dirty="0" smtClean="0">
+              <a:rPr lang="pt-BR" b="1" dirty="0">
                 <a:latin typeface="Montserrat" panose="00000500000000000000" pitchFamily="2" charset="0"/>
               </a:rPr>
               <a:t>Análise dos dados</a:t>
@@ -18937,7 +19068,7 @@
           <a:p>
             <a:pPr algn="ctr"/>
             <a:r>
-              <a:rPr lang="pt-BR" b="1" dirty="0" err="1" smtClean="0">
+              <a:rPr lang="pt-BR" b="1" dirty="0" err="1">
                 <a:latin typeface="Montserrat" panose="00000500000000000000" pitchFamily="2" charset="0"/>
               </a:rPr>
               <a:t>Dashboard</a:t>
@@ -18972,7 +19103,7 @@
           <a:p>
             <a:pPr algn="ctr"/>
             <a:r>
-              <a:rPr lang="pt-BR" b="1" dirty="0" smtClean="0">
+              <a:rPr lang="pt-BR" b="1" dirty="0">
                 <a:latin typeface="Montserrat" panose="00000500000000000000" pitchFamily="2" charset="0"/>
               </a:rPr>
               <a:t>Funcionários</a:t>
@@ -20546,7 +20677,7 @@
             <a:p>
               <a:pPr algn="ctr"/>
               <a:r>
-                <a:rPr lang="pt-BR" sz="5400" dirty="0" smtClean="0">
+                <a:rPr lang="pt-BR" sz="5400" dirty="0">
                   <a:solidFill>
                     <a:srgbClr val="3AAFA9"/>
                   </a:solidFill>
@@ -20554,12 +20685,6 @@
                 </a:rPr>
                 <a:t>BPMN</a:t>
               </a:r>
-              <a:endParaRPr lang="pt-BR" sz="5400" dirty="0">
-                <a:solidFill>
-                  <a:srgbClr val="3AAFA9"/>
-                </a:solidFill>
-                <a:latin typeface="Montserrat SemiBold" panose="00000700000000000000" pitchFamily="2" charset="0"/>
-              </a:endParaRPr>
             </a:p>
           </p:txBody>
         </p:sp>
@@ -20688,7 +20813,7 @@
                     <a14:useLocalDpi xmlns:a14="http://schemas.microsoft.com/office/drawing/2010/main" val="0"/>
                   </a:ext>
                   <a:ext uri="{96DAC541-7B7A-43D3-8B79-37D633B846F1}">
-                    <asvg:svgBlip xmlns="" xmlns:asvg="http://schemas.microsoft.com/office/drawing/2016/SVG/main" r:embed="rId3"/>
+                    <asvg:svgBlip xmlns:asvg="http://schemas.microsoft.com/office/drawing/2016/SVG/main" r:embed="rId3"/>
                   </a:ext>
                 </a:extLst>
               </a:blip>
@@ -21237,7 +21362,7 @@
             <a:p>
               <a:pPr algn="ctr"/>
               <a:r>
-                <a:rPr lang="pt-BR" sz="5400" dirty="0" smtClean="0">
+                <a:rPr lang="pt-BR" sz="5400" dirty="0">
                   <a:solidFill>
                     <a:srgbClr val="3AAFA9"/>
                   </a:solidFill>
@@ -21245,12 +21370,6 @@
                 </a:rPr>
                 <a:t>BPMN detalhado</a:t>
               </a:r>
-              <a:endParaRPr lang="pt-BR" sz="5400" dirty="0">
-                <a:solidFill>
-                  <a:srgbClr val="3AAFA9"/>
-                </a:solidFill>
-                <a:latin typeface="Montserrat SemiBold" panose="00000700000000000000" pitchFamily="2" charset="0"/>
-              </a:endParaRPr>
             </a:p>
           </p:txBody>
         </p:sp>
@@ -21379,7 +21498,7 @@
                     <a14:useLocalDpi xmlns:a14="http://schemas.microsoft.com/office/drawing/2010/main" val="0"/>
                   </a:ext>
                   <a:ext uri="{96DAC541-7B7A-43D3-8B79-37D633B846F1}">
-                    <asvg:svgBlip xmlns="" xmlns:asvg="http://schemas.microsoft.com/office/drawing/2016/SVG/main" r:embed="rId4"/>
+                    <asvg:svgBlip xmlns:asvg="http://schemas.microsoft.com/office/drawing/2016/SVG/main" r:embed="rId4"/>
                   </a:ext>
                 </a:extLst>
               </a:blip>
@@ -21774,7 +21893,7 @@
             <a:p>
               <a:pPr algn="ctr"/>
               <a:r>
-                <a:rPr lang="pt-BR" sz="5400" dirty="0" smtClean="0">
+                <a:rPr lang="pt-BR" sz="5400" dirty="0">
                   <a:solidFill>
                     <a:srgbClr val="3AAFA9"/>
                   </a:solidFill>
@@ -21782,12 +21901,6 @@
                 </a:rPr>
                 <a:t>Site</a:t>
               </a:r>
-              <a:endParaRPr lang="pt-BR" sz="5400" dirty="0">
-                <a:solidFill>
-                  <a:srgbClr val="3AAFA9"/>
-                </a:solidFill>
-                <a:latin typeface="Montserrat SemiBold" panose="00000700000000000000" pitchFamily="2" charset="0"/>
-              </a:endParaRPr>
             </a:p>
           </p:txBody>
         </p:sp>
@@ -21916,7 +22029,7 @@
                     <a14:useLocalDpi xmlns:a14="http://schemas.microsoft.com/office/drawing/2010/main" val="0"/>
                   </a:ext>
                   <a:ext uri="{96DAC541-7B7A-43D3-8B79-37D633B846F1}">
-                    <asvg:svgBlip xmlns="" xmlns:asvg="http://schemas.microsoft.com/office/drawing/2016/SVG/main" r:embed="rId4"/>
+                    <asvg:svgBlip xmlns:asvg="http://schemas.microsoft.com/office/drawing/2016/SVG/main" r:embed="rId4"/>
                   </a:ext>
                 </a:extLst>
               </a:blip>
@@ -22405,7 +22518,7 @@
           <a:p>
             <a:pPr algn="ctr"/>
             <a:r>
-              <a:rPr lang="pt-BR" sz="4800" dirty="0" smtClean="0">
+              <a:rPr lang="pt-BR" sz="4800" dirty="0">
                 <a:solidFill>
                   <a:srgbClr val="2B7A78"/>
                 </a:solidFill>
@@ -22538,7 +22651,7 @@
                 <a14:useLocalDpi xmlns:a14="http://schemas.microsoft.com/office/drawing/2010/main" val="0"/>
               </a:ext>
               <a:ext uri="{96DAC541-7B7A-43D3-8B79-37D633B846F1}">
-                <asvg:svgBlip xmlns="" xmlns:asvg="http://schemas.microsoft.com/office/drawing/2016/SVG/main" r:embed="rId4"/>
+                <asvg:svgBlip xmlns:asvg="http://schemas.microsoft.com/office/drawing/2016/SVG/main" r:embed="rId4"/>
               </a:ext>
             </a:extLst>
           </a:blip>
@@ -22752,7 +22865,7 @@
           <a:lstStyle/>
           <a:p>
             <a:r>
-              <a:rPr lang="pt-BR" sz="2000" dirty="0" err="1" smtClean="0">
+              <a:rPr lang="pt-BR" sz="2000" dirty="0" err="1">
                 <a:solidFill>
                   <a:srgbClr val="F1F6FB"/>
                 </a:solidFill>
@@ -23032,7 +23145,7 @@
           <a:lstStyle/>
           <a:p>
             <a:r>
-              <a:rPr lang="pt-BR" sz="2000" dirty="0" smtClean="0">
+              <a:rPr lang="pt-BR" sz="2000" dirty="0">
                 <a:solidFill>
                   <a:srgbClr val="F1F6FB"/>
                 </a:solidFill>
@@ -23040,12 +23153,6 @@
               </a:rPr>
               <a:t>Máquinas</a:t>
             </a:r>
-            <a:endParaRPr lang="pt-BR" sz="2000" dirty="0">
-              <a:solidFill>
-                <a:srgbClr val="F1F6FB"/>
-              </a:solidFill>
-              <a:latin typeface="Eras Medium ITC" panose="020B0602030504020804" pitchFamily="34" charset="0"/>
-            </a:endParaRPr>
           </a:p>
         </p:txBody>
       </p:sp>
@@ -24205,7 +24312,7 @@
             <a:p>
               <a:pPr algn="ctr"/>
               <a:r>
-                <a:rPr lang="pt-BR" sz="5400" dirty="0" smtClean="0">
+                <a:rPr lang="pt-BR" sz="5400" dirty="0">
                   <a:solidFill>
                     <a:srgbClr val="3AAFA9"/>
                   </a:solidFill>
@@ -24214,7 +24321,7 @@
                 <a:t>Protótipo </a:t>
               </a:r>
               <a:r>
-                <a:rPr lang="pt-BR" sz="5400" dirty="0" err="1" smtClean="0">
+                <a:rPr lang="pt-BR" sz="5400" dirty="0" err="1">
                   <a:solidFill>
                     <a:srgbClr val="3AAFA9"/>
                   </a:solidFill>
@@ -24356,7 +24463,7 @@
                     <a14:useLocalDpi xmlns:a14="http://schemas.microsoft.com/office/drawing/2010/main" val="0"/>
                   </a:ext>
                   <a:ext uri="{96DAC541-7B7A-43D3-8B79-37D633B846F1}">
-                    <asvg:svgBlip xmlns="" xmlns:asvg="http://schemas.microsoft.com/office/drawing/2016/SVG/main" r:embed="rId3"/>
+                    <asvg:svgBlip xmlns:asvg="http://schemas.microsoft.com/office/drawing/2016/SVG/main" r:embed="rId3"/>
                   </a:ext>
                 </a:extLst>
               </a:blip>
@@ -24869,7 +24976,7 @@
             <a:p>
               <a:pPr algn="ctr"/>
               <a:r>
-                <a:rPr lang="pt-BR" sz="5400" dirty="0" smtClean="0">
+                <a:rPr lang="pt-BR" sz="5400" dirty="0">
                   <a:solidFill>
                     <a:srgbClr val="3AAFA9"/>
                   </a:solidFill>
@@ -24878,7 +24985,7 @@
                 <a:t>Protótipo </a:t>
               </a:r>
               <a:r>
-                <a:rPr lang="pt-BR" sz="5400" dirty="0" err="1" smtClean="0">
+                <a:rPr lang="pt-BR" sz="5400" dirty="0" err="1">
                   <a:solidFill>
                     <a:srgbClr val="3AAFA9"/>
                   </a:solidFill>
@@ -25020,7 +25127,7 @@
                     <a14:useLocalDpi xmlns:a14="http://schemas.microsoft.com/office/drawing/2010/main" val="0"/>
                   </a:ext>
                   <a:ext uri="{96DAC541-7B7A-43D3-8B79-37D633B846F1}">
-                    <asvg:svgBlip xmlns="" xmlns:asvg="http://schemas.microsoft.com/office/drawing/2016/SVG/main" r:embed="rId3"/>
+                    <asvg:svgBlip xmlns:asvg="http://schemas.microsoft.com/office/drawing/2016/SVG/main" r:embed="rId3"/>
                   </a:ext>
                 </a:extLst>
               </a:blip>
@@ -25610,6 +25717,12 @@
 </file>
 
 <file path=customXml/item1.xml><?xml version="1.0" encoding="utf-8"?>
+<p:properties xmlns:p="http://schemas.microsoft.com/office/2006/metadata/properties" xmlns:xsi="http://www.w3.org/2001/XMLSchema-instance" xmlns:pc="http://schemas.microsoft.com/office/infopath/2007/PartnerControls">
+  <documentManagement/>
+</p:properties>
+</file>
+
+<file path=customXml/item2.xml><?xml version="1.0" encoding="utf-8"?>
 <ct:contentTypeSchema xmlns:ct="http://schemas.microsoft.com/office/2006/metadata/contentType" xmlns:ma="http://schemas.microsoft.com/office/2006/metadata/properties/metaAttributes" ct:_="" ma:_="" ma:contentTypeName="Document" ma:contentTypeID="0x010100A663B016B9E10D44AF2D6A2076639652" ma:contentTypeVersion="9" ma:contentTypeDescription="Create a new document." ma:contentTypeScope="" ma:versionID="487f2b4f5bb26e664e658aeeb82afc06">
   <xsd:schema xmlns:xsd="http://www.w3.org/2001/XMLSchema" xmlns:xs="http://www.w3.org/2001/XMLSchema" xmlns:p="http://schemas.microsoft.com/office/2006/metadata/properties" xmlns:ns3="1f168f81-3f83-4b33-9f0c-ec152bce3f98" xmlns:ns4="86822d51-02f5-488a-80f3-0b621e7c317a" targetNamespace="http://schemas.microsoft.com/office/2006/metadata/properties" ma:root="true" ma:fieldsID="edc5afedb1afb76831d7c08402d80832" ns3:_="" ns4:_="">
     <xsd:import namespace="1f168f81-3f83-4b33-9f0c-ec152bce3f98"/>
@@ -25806,12 +25919,6 @@
 </ct:contentTypeSchema>
 </file>
 
-<file path=customXml/item2.xml><?xml version="1.0" encoding="utf-8"?>
-<p:properties xmlns:p="http://schemas.microsoft.com/office/2006/metadata/properties" xmlns:xsi="http://www.w3.org/2001/XMLSchema-instance" xmlns:pc="http://schemas.microsoft.com/office/infopath/2007/PartnerControls">
-  <documentManagement/>
-</p:properties>
-</file>
-
 <file path=customXml/item3.xml><?xml version="1.0" encoding="utf-8"?>
 <?mso-contentType ?>
 <FormTemplates xmlns="http://schemas.microsoft.com/sharepoint/v3/contenttype/forms">
@@ -25822,6 +25929,23 @@
 </file>
 
 <file path=customXml/itemProps1.xml><?xml version="1.0" encoding="utf-8"?>
+<ds:datastoreItem xmlns:ds="http://schemas.openxmlformats.org/officeDocument/2006/customXml" ds:itemID="{7972C250-C430-4380-B8BD-02E395B67AF0}">
+  <ds:schemaRefs>
+    <ds:schemaRef ds:uri="http://purl.org/dc/dcmitype/"/>
+    <ds:schemaRef ds:uri="http://purl.org/dc/terms/"/>
+    <ds:schemaRef ds:uri="http://schemas.openxmlformats.org/package/2006/metadata/core-properties"/>
+    <ds:schemaRef ds:uri="http://schemas.microsoft.com/office/2006/documentManagement/types"/>
+    <ds:schemaRef ds:uri="http://www.w3.org/XML/1998/namespace"/>
+    <ds:schemaRef ds:uri="http://schemas.microsoft.com/office/infopath/2007/PartnerControls"/>
+    <ds:schemaRef ds:uri="http://purl.org/dc/elements/1.1/"/>
+    <ds:schemaRef ds:uri="86822d51-02f5-488a-80f3-0b621e7c317a"/>
+    <ds:schemaRef ds:uri="1f168f81-3f83-4b33-9f0c-ec152bce3f98"/>
+    <ds:schemaRef ds:uri="http://schemas.microsoft.com/office/2006/metadata/properties"/>
+  </ds:schemaRefs>
+</ds:datastoreItem>
+</file>
+
+<file path=customXml/itemProps2.xml><?xml version="1.0" encoding="utf-8"?>
 <ds:datastoreItem xmlns:ds="http://schemas.openxmlformats.org/officeDocument/2006/customXml" ds:itemID="{ED87D459-01C6-46F3-85EB-8A8AB455C67D}">
   <ds:schemaRefs>
     <ds:schemaRef ds:uri="http://schemas.microsoft.com/office/2006/metadata/contentType"/>
@@ -25840,23 +25964,6 @@
 </ds:datastoreItem>
 </file>
 
-<file path=customXml/itemProps2.xml><?xml version="1.0" encoding="utf-8"?>
-<ds:datastoreItem xmlns:ds="http://schemas.openxmlformats.org/officeDocument/2006/customXml" ds:itemID="{7972C250-C430-4380-B8BD-02E395B67AF0}">
-  <ds:schemaRefs>
-    <ds:schemaRef ds:uri="http://purl.org/dc/dcmitype/"/>
-    <ds:schemaRef ds:uri="http://purl.org/dc/terms/"/>
-    <ds:schemaRef ds:uri="http://schemas.openxmlformats.org/package/2006/metadata/core-properties"/>
-    <ds:schemaRef ds:uri="http://schemas.microsoft.com/office/2006/documentManagement/types"/>
-    <ds:schemaRef ds:uri="http://www.w3.org/XML/1998/namespace"/>
-    <ds:schemaRef ds:uri="http://schemas.microsoft.com/office/infopath/2007/PartnerControls"/>
-    <ds:schemaRef ds:uri="http://purl.org/dc/elements/1.1/"/>
-    <ds:schemaRef ds:uri="86822d51-02f5-488a-80f3-0b621e7c317a"/>
-    <ds:schemaRef ds:uri="1f168f81-3f83-4b33-9f0c-ec152bce3f98"/>
-    <ds:schemaRef ds:uri="http://schemas.microsoft.com/office/2006/metadata/properties"/>
-  </ds:schemaRefs>
-</ds:datastoreItem>
-</file>
-
 <file path=customXml/itemProps3.xml><?xml version="1.0" encoding="utf-8"?>
 <ds:datastoreItem xmlns:ds="http://schemas.openxmlformats.org/officeDocument/2006/customXml" ds:itemID="{E12B114C-EB44-46E6-930B-B69E30F6F9AE}">
   <ds:schemaRefs>

</xml_diff>